<commit_message>
upload the stm32 figure and combine with lora e32
</commit_message>
<xml_diff>
--- a/figures/figures.pptx
+++ b/figures/figures.pptx
@@ -6,6 +6,7 @@
   </p:sldMasterIdLst>
   <p:sldIdLst>
     <p:sldId id="256" r:id="rId2"/>
+    <p:sldId id="257" r:id="rId3"/>
   </p:sldIdLst>
   <p:sldSz cx="12192000" cy="6858000"/>
   <p:notesSz cx="6858000" cy="9144000"/>
@@ -243,7 +244,7 @@
           <a:p>
             <a:fld id="{501228E0-F51F-4F42-BDA3-0C1DEEAD41C0}" type="datetimeFigureOut">
               <a:rPr lang="zh-TW" altLang="en-US" smtClean="0"/>
-              <a:t>2021/1/18</a:t>
+              <a:t>2021/1/19</a:t>
             </a:fld>
             <a:endParaRPr lang="zh-TW" altLang="en-US"/>
           </a:p>
@@ -413,7 +414,7 @@
           <a:p>
             <a:fld id="{501228E0-F51F-4F42-BDA3-0C1DEEAD41C0}" type="datetimeFigureOut">
               <a:rPr lang="zh-TW" altLang="en-US" smtClean="0"/>
-              <a:t>2021/1/18</a:t>
+              <a:t>2021/1/19</a:t>
             </a:fld>
             <a:endParaRPr lang="zh-TW" altLang="en-US"/>
           </a:p>
@@ -593,7 +594,7 @@
           <a:p>
             <a:fld id="{501228E0-F51F-4F42-BDA3-0C1DEEAD41C0}" type="datetimeFigureOut">
               <a:rPr lang="zh-TW" altLang="en-US" smtClean="0"/>
-              <a:t>2021/1/18</a:t>
+              <a:t>2021/1/19</a:t>
             </a:fld>
             <a:endParaRPr lang="zh-TW" altLang="en-US"/>
           </a:p>
@@ -763,7 +764,7 @@
           <a:p>
             <a:fld id="{501228E0-F51F-4F42-BDA3-0C1DEEAD41C0}" type="datetimeFigureOut">
               <a:rPr lang="zh-TW" altLang="en-US" smtClean="0"/>
-              <a:t>2021/1/18</a:t>
+              <a:t>2021/1/19</a:t>
             </a:fld>
             <a:endParaRPr lang="zh-TW" altLang="en-US"/>
           </a:p>
@@ -1009,7 +1010,7 @@
           <a:p>
             <a:fld id="{501228E0-F51F-4F42-BDA3-0C1DEEAD41C0}" type="datetimeFigureOut">
               <a:rPr lang="zh-TW" altLang="en-US" smtClean="0"/>
-              <a:t>2021/1/18</a:t>
+              <a:t>2021/1/19</a:t>
             </a:fld>
             <a:endParaRPr lang="zh-TW" altLang="en-US"/>
           </a:p>
@@ -1241,7 +1242,7 @@
           <a:p>
             <a:fld id="{501228E0-F51F-4F42-BDA3-0C1DEEAD41C0}" type="datetimeFigureOut">
               <a:rPr lang="zh-TW" altLang="en-US" smtClean="0"/>
-              <a:t>2021/1/18</a:t>
+              <a:t>2021/1/19</a:t>
             </a:fld>
             <a:endParaRPr lang="zh-TW" altLang="en-US"/>
           </a:p>
@@ -1608,7 +1609,7 @@
           <a:p>
             <a:fld id="{501228E0-F51F-4F42-BDA3-0C1DEEAD41C0}" type="datetimeFigureOut">
               <a:rPr lang="zh-TW" altLang="en-US" smtClean="0"/>
-              <a:t>2021/1/18</a:t>
+              <a:t>2021/1/19</a:t>
             </a:fld>
             <a:endParaRPr lang="zh-TW" altLang="en-US"/>
           </a:p>
@@ -1726,7 +1727,7 @@
           <a:p>
             <a:fld id="{501228E0-F51F-4F42-BDA3-0C1DEEAD41C0}" type="datetimeFigureOut">
               <a:rPr lang="zh-TW" altLang="en-US" smtClean="0"/>
-              <a:t>2021/1/18</a:t>
+              <a:t>2021/1/19</a:t>
             </a:fld>
             <a:endParaRPr lang="zh-TW" altLang="en-US"/>
           </a:p>
@@ -1821,7 +1822,7 @@
           <a:p>
             <a:fld id="{501228E0-F51F-4F42-BDA3-0C1DEEAD41C0}" type="datetimeFigureOut">
               <a:rPr lang="zh-TW" altLang="en-US" smtClean="0"/>
-              <a:t>2021/1/18</a:t>
+              <a:t>2021/1/19</a:t>
             </a:fld>
             <a:endParaRPr lang="zh-TW" altLang="en-US"/>
           </a:p>
@@ -2098,7 +2099,7 @@
           <a:p>
             <a:fld id="{501228E0-F51F-4F42-BDA3-0C1DEEAD41C0}" type="datetimeFigureOut">
               <a:rPr lang="zh-TW" altLang="en-US" smtClean="0"/>
-              <a:t>2021/1/18</a:t>
+              <a:t>2021/1/19</a:t>
             </a:fld>
             <a:endParaRPr lang="zh-TW" altLang="en-US"/>
           </a:p>
@@ -2351,7 +2352,7 @@
           <a:p>
             <a:fld id="{501228E0-F51F-4F42-BDA3-0C1DEEAD41C0}" type="datetimeFigureOut">
               <a:rPr lang="zh-TW" altLang="en-US" smtClean="0"/>
-              <a:t>2021/1/18</a:t>
+              <a:t>2021/1/19</a:t>
             </a:fld>
             <a:endParaRPr lang="zh-TW" altLang="en-US"/>
           </a:p>
@@ -2564,7 +2565,7 @@
           <a:p>
             <a:fld id="{501228E0-F51F-4F42-BDA3-0C1DEEAD41C0}" type="datetimeFigureOut">
               <a:rPr lang="zh-TW" altLang="en-US" smtClean="0"/>
-              <a:t>2021/1/18</a:t>
+              <a:t>2021/1/19</a:t>
             </a:fld>
             <a:endParaRPr lang="zh-TW" altLang="en-US"/>
           </a:p>
@@ -3263,6 +3264,621 @@
 </p:sld>
 </file>
 
+<file path=ppt/slides/slide2.xml><?xml version="1.0" encoding="utf-8"?>
+<p:sld xmlns:a="http://schemas.openxmlformats.org/drawingml/2006/main" xmlns:r="http://schemas.openxmlformats.org/officeDocument/2006/relationships" xmlns:p="http://schemas.openxmlformats.org/presentationml/2006/main">
+  <p:cSld>
+    <p:spTree>
+      <p:nvGrpSpPr>
+        <p:cNvPr id="1" name=""/>
+        <p:cNvGrpSpPr/>
+        <p:nvPr/>
+      </p:nvGrpSpPr>
+      <p:grpSpPr>
+        <a:xfrm>
+          <a:off x="0" y="0"/>
+          <a:ext cx="0" cy="0"/>
+          <a:chOff x="0" y="0"/>
+          <a:chExt cx="0" cy="0"/>
+        </a:xfrm>
+      </p:grpSpPr>
+      <p:grpSp>
+        <p:nvGrpSpPr>
+          <p:cNvPr id="21" name="群組 20"/>
+          <p:cNvGrpSpPr/>
+          <p:nvPr/>
+        </p:nvGrpSpPr>
+        <p:grpSpPr>
+          <a:xfrm>
+            <a:off x="1396538" y="706050"/>
+            <a:ext cx="9465599" cy="5053636"/>
+            <a:chOff x="1396538" y="706050"/>
+            <a:chExt cx="9465599" cy="5053636"/>
+          </a:xfrm>
+        </p:grpSpPr>
+        <p:pic>
+          <p:nvPicPr>
+            <p:cNvPr id="4" name="圖片 3"/>
+            <p:cNvPicPr>
+              <a:picLocks noChangeAspect="1"/>
+            </p:cNvPicPr>
+            <p:nvPr/>
+          </p:nvPicPr>
+          <p:blipFill>
+            <a:blip r:embed="rId2">
+              <a:extLst>
+                <a:ext uri="{28A0092B-C50C-407E-A947-70E740481C1C}">
+                  <a14:useLocalDpi xmlns:a14="http://schemas.microsoft.com/office/drawing/2010/main" val="0"/>
+                </a:ext>
+              </a:extLst>
+            </a:blip>
+            <a:stretch>
+              <a:fillRect/>
+            </a:stretch>
+          </p:blipFill>
+          <p:spPr>
+            <a:xfrm>
+              <a:off x="1396538" y="706050"/>
+              <a:ext cx="3862128" cy="5053636"/>
+            </a:xfrm>
+            <a:prstGeom prst="rect">
+              <a:avLst/>
+            </a:prstGeom>
+          </p:spPr>
+        </p:pic>
+        <p:grpSp>
+          <p:nvGrpSpPr>
+            <p:cNvPr id="5" name="群組 4"/>
+            <p:cNvGrpSpPr/>
+            <p:nvPr/>
+          </p:nvGrpSpPr>
+          <p:grpSpPr>
+            <a:xfrm>
+              <a:off x="6308842" y="2593297"/>
+              <a:ext cx="4553295" cy="1714500"/>
+              <a:chOff x="3590580" y="2571750"/>
+              <a:chExt cx="4553295" cy="1714500"/>
+            </a:xfrm>
+          </p:grpSpPr>
+          <p:pic>
+            <p:nvPicPr>
+              <p:cNvPr id="6" name="圖片 5"/>
+              <p:cNvPicPr>
+                <a:picLocks noChangeAspect="1"/>
+              </p:cNvPicPr>
+              <p:nvPr/>
+            </p:nvPicPr>
+            <p:blipFill>
+              <a:blip r:embed="rId3">
+                <a:extLst>
+                  <a:ext uri="{28A0092B-C50C-407E-A947-70E740481C1C}">
+                    <a14:useLocalDpi xmlns:a14="http://schemas.microsoft.com/office/drawing/2010/main" val="0"/>
+                  </a:ext>
+                </a:extLst>
+              </a:blip>
+              <a:stretch>
+                <a:fillRect/>
+              </a:stretch>
+            </p:blipFill>
+            <p:spPr>
+              <a:xfrm>
+                <a:off x="4048125" y="2571750"/>
+                <a:ext cx="4095750" cy="1714500"/>
+              </a:xfrm>
+              <a:prstGeom prst="rect">
+                <a:avLst/>
+              </a:prstGeom>
+            </p:spPr>
+          </p:pic>
+          <p:grpSp>
+            <p:nvGrpSpPr>
+              <p:cNvPr id="7" name="群組 6"/>
+              <p:cNvGrpSpPr/>
+              <p:nvPr/>
+            </p:nvGrpSpPr>
+            <p:grpSpPr>
+              <a:xfrm>
+                <a:off x="3590580" y="2740748"/>
+                <a:ext cx="573405" cy="1376504"/>
+                <a:chOff x="3528667" y="2736332"/>
+                <a:chExt cx="573405" cy="1376504"/>
+              </a:xfrm>
+            </p:grpSpPr>
+            <p:sp>
+              <p:nvSpPr>
+                <p:cNvPr id="8" name="文字方塊 7"/>
+                <p:cNvSpPr txBox="1"/>
+                <p:nvPr/>
+              </p:nvSpPr>
+              <p:spPr>
+                <a:xfrm>
+                  <a:off x="3582613" y="2736332"/>
+                  <a:ext cx="465512" cy="307777"/>
+                </a:xfrm>
+                <a:prstGeom prst="rect">
+                  <a:avLst/>
+                </a:prstGeom>
+                <a:noFill/>
+              </p:spPr>
+              <p:txBody>
+                <a:bodyPr wrap="square" rtlCol="0" anchor="ctr">
+                  <a:spAutoFit/>
+                </a:bodyPr>
+                <a:lstStyle/>
+                <a:p>
+                  <a:pPr algn="ctr"/>
+                  <a:r>
+                    <a:rPr lang="en-US" altLang="zh-TW" sz="1400" dirty="0" smtClean="0"/>
+                    <a:t>M0</a:t>
+                  </a:r>
+                  <a:endParaRPr lang="zh-TW" altLang="en-US" dirty="0"/>
+                </a:p>
+              </p:txBody>
+            </p:sp>
+            <p:sp>
+              <p:nvSpPr>
+                <p:cNvPr id="9" name="文字方塊 8"/>
+                <p:cNvSpPr txBox="1"/>
+                <p:nvPr/>
+              </p:nvSpPr>
+              <p:spPr>
+                <a:xfrm>
+                  <a:off x="3582613" y="2923601"/>
+                  <a:ext cx="465512" cy="307777"/>
+                </a:xfrm>
+                <a:prstGeom prst="rect">
+                  <a:avLst/>
+                </a:prstGeom>
+                <a:noFill/>
+              </p:spPr>
+              <p:txBody>
+                <a:bodyPr wrap="square" rtlCol="0" anchor="ctr">
+                  <a:spAutoFit/>
+                </a:bodyPr>
+                <a:lstStyle/>
+                <a:p>
+                  <a:pPr algn="ctr"/>
+                  <a:r>
+                    <a:rPr lang="en-US" altLang="zh-TW" sz="1400" dirty="0" smtClean="0"/>
+                    <a:t>M1</a:t>
+                  </a:r>
+                  <a:endParaRPr lang="zh-TW" altLang="en-US" dirty="0"/>
+                </a:p>
+              </p:txBody>
+            </p:sp>
+            <p:sp>
+              <p:nvSpPr>
+                <p:cNvPr id="10" name="文字方塊 9"/>
+                <p:cNvSpPr txBox="1"/>
+                <p:nvPr/>
+              </p:nvSpPr>
+              <p:spPr>
+                <a:xfrm>
+                  <a:off x="3528667" y="3108178"/>
+                  <a:ext cx="573405" cy="307777"/>
+                </a:xfrm>
+                <a:prstGeom prst="rect">
+                  <a:avLst/>
+                </a:prstGeom>
+                <a:noFill/>
+              </p:spPr>
+              <p:txBody>
+                <a:bodyPr wrap="square" rtlCol="0" anchor="ctr">
+                  <a:spAutoFit/>
+                </a:bodyPr>
+                <a:lstStyle/>
+                <a:p>
+                  <a:pPr algn="ctr"/>
+                  <a:r>
+                    <a:rPr lang="en-US" altLang="zh-TW" sz="1400" dirty="0" smtClean="0"/>
+                    <a:t>RXD</a:t>
+                  </a:r>
+                  <a:endParaRPr lang="zh-TW" altLang="en-US" dirty="0"/>
+                </a:p>
+              </p:txBody>
+            </p:sp>
+            <p:sp>
+              <p:nvSpPr>
+                <p:cNvPr id="11" name="文字方塊 10"/>
+                <p:cNvSpPr txBox="1"/>
+                <p:nvPr/>
+              </p:nvSpPr>
+              <p:spPr>
+                <a:xfrm>
+                  <a:off x="3528667" y="3290032"/>
+                  <a:ext cx="573405" cy="307777"/>
+                </a:xfrm>
+                <a:prstGeom prst="rect">
+                  <a:avLst/>
+                </a:prstGeom>
+                <a:noFill/>
+              </p:spPr>
+              <p:txBody>
+                <a:bodyPr wrap="square" rtlCol="0" anchor="ctr">
+                  <a:spAutoFit/>
+                </a:bodyPr>
+                <a:lstStyle/>
+                <a:p>
+                  <a:pPr algn="ctr"/>
+                  <a:r>
+                    <a:rPr lang="en-US" altLang="zh-TW" sz="1400" dirty="0"/>
+                    <a:t>T</a:t>
+                  </a:r>
+                  <a:r>
+                    <a:rPr lang="en-US" altLang="zh-TW" sz="1400" dirty="0" smtClean="0"/>
+                    <a:t>XD</a:t>
+                  </a:r>
+                  <a:endParaRPr lang="zh-TW" altLang="en-US" dirty="0"/>
+                </a:p>
+              </p:txBody>
+            </p:sp>
+            <p:sp>
+              <p:nvSpPr>
+                <p:cNvPr id="12" name="文字方塊 11"/>
+                <p:cNvSpPr txBox="1"/>
+                <p:nvPr/>
+              </p:nvSpPr>
+              <p:spPr>
+                <a:xfrm>
+                  <a:off x="3528667" y="3460771"/>
+                  <a:ext cx="573405" cy="307777"/>
+                </a:xfrm>
+                <a:prstGeom prst="rect">
+                  <a:avLst/>
+                </a:prstGeom>
+                <a:noFill/>
+              </p:spPr>
+              <p:txBody>
+                <a:bodyPr wrap="square" rtlCol="0" anchor="ctr">
+                  <a:spAutoFit/>
+                </a:bodyPr>
+                <a:lstStyle/>
+                <a:p>
+                  <a:pPr algn="ctr"/>
+                  <a:r>
+                    <a:rPr lang="en-US" altLang="zh-TW" sz="1400" dirty="0" smtClean="0"/>
+                    <a:t>AUX</a:t>
+                  </a:r>
+                  <a:endParaRPr lang="zh-TW" altLang="en-US" dirty="0"/>
+                </a:p>
+              </p:txBody>
+            </p:sp>
+            <p:sp>
+              <p:nvSpPr>
+                <p:cNvPr id="13" name="文字方塊 12"/>
+                <p:cNvSpPr txBox="1"/>
+                <p:nvPr/>
+              </p:nvSpPr>
+              <p:spPr>
+                <a:xfrm>
+                  <a:off x="3528667" y="3634320"/>
+                  <a:ext cx="573405" cy="307777"/>
+                </a:xfrm>
+                <a:prstGeom prst="rect">
+                  <a:avLst/>
+                </a:prstGeom>
+                <a:noFill/>
+              </p:spPr>
+              <p:txBody>
+                <a:bodyPr wrap="square" rtlCol="0" anchor="ctr">
+                  <a:spAutoFit/>
+                </a:bodyPr>
+                <a:lstStyle/>
+                <a:p>
+                  <a:pPr algn="ctr"/>
+                  <a:r>
+                    <a:rPr lang="en-US" altLang="zh-TW" sz="1400" dirty="0" smtClean="0"/>
+                    <a:t>VCC</a:t>
+                  </a:r>
+                  <a:endParaRPr lang="zh-TW" altLang="en-US" dirty="0"/>
+                </a:p>
+              </p:txBody>
+            </p:sp>
+            <p:sp>
+              <p:nvSpPr>
+                <p:cNvPr id="14" name="文字方塊 13"/>
+                <p:cNvSpPr txBox="1"/>
+                <p:nvPr/>
+              </p:nvSpPr>
+              <p:spPr>
+                <a:xfrm>
+                  <a:off x="3528667" y="3805059"/>
+                  <a:ext cx="573405" cy="307777"/>
+                </a:xfrm>
+                <a:prstGeom prst="rect">
+                  <a:avLst/>
+                </a:prstGeom>
+                <a:noFill/>
+              </p:spPr>
+              <p:txBody>
+                <a:bodyPr wrap="square" rtlCol="0" anchor="ctr">
+                  <a:spAutoFit/>
+                </a:bodyPr>
+                <a:lstStyle/>
+                <a:p>
+                  <a:pPr algn="ctr"/>
+                  <a:r>
+                    <a:rPr lang="en-US" altLang="zh-TW" sz="1400" dirty="0" smtClean="0"/>
+                    <a:t>GND</a:t>
+                  </a:r>
+                  <a:endParaRPr lang="zh-TW" altLang="en-US" dirty="0"/>
+                </a:p>
+              </p:txBody>
+            </p:sp>
+          </p:grpSp>
+        </p:grpSp>
+        <p:cxnSp>
+          <p:nvCxnSpPr>
+            <p:cNvPr id="18" name="肘形接點 17"/>
+            <p:cNvCxnSpPr>
+              <a:stCxn id="8" idx="1"/>
+            </p:cNvCxnSpPr>
+            <p:nvPr/>
+          </p:nvCxnSpPr>
+          <p:spPr>
+            <a:xfrm rot="10800000">
+              <a:off x="4937760" y="2477194"/>
+              <a:ext cx="1425028" cy="438991"/>
+            </a:xfrm>
+            <a:prstGeom prst="bentConnector3">
+              <a:avLst/>
+            </a:prstGeom>
+            <a:ln w="28575">
+              <a:solidFill>
+                <a:schemeClr val="tx1"/>
+              </a:solidFill>
+            </a:ln>
+          </p:spPr>
+          <p:style>
+            <a:lnRef idx="1">
+              <a:schemeClr val="accent1"/>
+            </a:lnRef>
+            <a:fillRef idx="0">
+              <a:schemeClr val="accent1"/>
+            </a:fillRef>
+            <a:effectRef idx="0">
+              <a:schemeClr val="accent1"/>
+            </a:effectRef>
+            <a:fontRef idx="minor">
+              <a:schemeClr val="tx1"/>
+            </a:fontRef>
+          </p:style>
+        </p:cxnSp>
+        <p:cxnSp>
+          <p:nvCxnSpPr>
+            <p:cNvPr id="20" name="肘形接點 19"/>
+            <p:cNvCxnSpPr>
+              <a:stCxn id="9" idx="1"/>
+            </p:cNvCxnSpPr>
+            <p:nvPr/>
+          </p:nvCxnSpPr>
+          <p:spPr>
+            <a:xfrm rot="10800000">
+              <a:off x="5650274" y="2913053"/>
+              <a:ext cx="712514" cy="190400"/>
+            </a:xfrm>
+            <a:prstGeom prst="bentConnector3">
+              <a:avLst>
+                <a:gd name="adj1" fmla="val 100131"/>
+              </a:avLst>
+            </a:prstGeom>
+            <a:ln w="28575">
+              <a:solidFill>
+                <a:schemeClr val="tx1"/>
+              </a:solidFill>
+            </a:ln>
+          </p:spPr>
+          <p:style>
+            <a:lnRef idx="1">
+              <a:schemeClr val="accent1"/>
+            </a:lnRef>
+            <a:fillRef idx="0">
+              <a:schemeClr val="accent1"/>
+            </a:fillRef>
+            <a:effectRef idx="0">
+              <a:schemeClr val="accent1"/>
+            </a:effectRef>
+            <a:fontRef idx="minor">
+              <a:schemeClr val="tx1"/>
+            </a:fontRef>
+          </p:style>
+        </p:cxnSp>
+        <p:cxnSp>
+          <p:nvCxnSpPr>
+            <p:cNvPr id="28" name="肘形接點 27"/>
+            <p:cNvCxnSpPr/>
+            <p:nvPr/>
+          </p:nvCxnSpPr>
+          <p:spPr>
+            <a:xfrm rot="10800000" flipV="1">
+              <a:off x="4937760" y="3288029"/>
+              <a:ext cx="1425031" cy="1422000"/>
+            </a:xfrm>
+            <a:prstGeom prst="bentConnector3">
+              <a:avLst>
+                <a:gd name="adj1" fmla="val 50000"/>
+              </a:avLst>
+            </a:prstGeom>
+            <a:ln w="28575">
+              <a:solidFill>
+                <a:srgbClr val="0070C0"/>
+              </a:solidFill>
+            </a:ln>
+          </p:spPr>
+          <p:style>
+            <a:lnRef idx="1">
+              <a:schemeClr val="accent1"/>
+            </a:lnRef>
+            <a:fillRef idx="0">
+              <a:schemeClr val="accent1"/>
+            </a:fillRef>
+            <a:effectRef idx="0">
+              <a:schemeClr val="accent1"/>
+            </a:effectRef>
+            <a:fontRef idx="minor">
+              <a:schemeClr val="tx1"/>
+            </a:fontRef>
+          </p:style>
+        </p:cxnSp>
+        <p:cxnSp>
+          <p:nvCxnSpPr>
+            <p:cNvPr id="39" name="直線接點 38"/>
+            <p:cNvCxnSpPr/>
+            <p:nvPr/>
+          </p:nvCxnSpPr>
+          <p:spPr>
+            <a:xfrm flipH="1" flipV="1">
+              <a:off x="4199226" y="3468615"/>
+              <a:ext cx="2163562" cy="1"/>
+            </a:xfrm>
+            <a:prstGeom prst="line">
+              <a:avLst/>
+            </a:prstGeom>
+            <a:ln w="28575">
+              <a:solidFill>
+                <a:srgbClr val="FFC000"/>
+              </a:solidFill>
+            </a:ln>
+          </p:spPr>
+          <p:style>
+            <a:lnRef idx="1">
+              <a:schemeClr val="accent1"/>
+            </a:lnRef>
+            <a:fillRef idx="0">
+              <a:schemeClr val="accent1"/>
+            </a:fillRef>
+            <a:effectRef idx="0">
+              <a:schemeClr val="accent1"/>
+            </a:effectRef>
+            <a:fontRef idx="minor">
+              <a:schemeClr val="tx1"/>
+            </a:fontRef>
+          </p:style>
+        </p:cxnSp>
+        <p:cxnSp>
+          <p:nvCxnSpPr>
+            <p:cNvPr id="41" name="肘形接點 40"/>
+            <p:cNvCxnSpPr/>
+            <p:nvPr/>
+          </p:nvCxnSpPr>
+          <p:spPr>
+            <a:xfrm rot="16200000" flipH="1">
+              <a:off x="3616888" y="4028761"/>
+              <a:ext cx="1255381" cy="107156"/>
+            </a:xfrm>
+            <a:prstGeom prst="bentConnector3">
+              <a:avLst>
+                <a:gd name="adj1" fmla="val 98938"/>
+              </a:avLst>
+            </a:prstGeom>
+            <a:ln w="28575">
+              <a:solidFill>
+                <a:srgbClr val="FFC000"/>
+              </a:solidFill>
+            </a:ln>
+          </p:spPr>
+          <p:style>
+            <a:lnRef idx="1">
+              <a:schemeClr val="accent1"/>
+            </a:lnRef>
+            <a:fillRef idx="0">
+              <a:schemeClr val="accent1"/>
+            </a:fillRef>
+            <a:effectRef idx="0">
+              <a:schemeClr val="accent1"/>
+            </a:effectRef>
+            <a:fontRef idx="minor">
+              <a:schemeClr val="tx1"/>
+            </a:fontRef>
+          </p:style>
+        </p:cxnSp>
+        <p:cxnSp>
+          <p:nvCxnSpPr>
+            <p:cNvPr id="48" name="肘形接點 47"/>
+            <p:cNvCxnSpPr/>
+            <p:nvPr/>
+          </p:nvCxnSpPr>
+          <p:spPr>
+            <a:xfrm rot="10800000">
+              <a:off x="4937760" y="2610627"/>
+              <a:ext cx="1425031" cy="1220396"/>
+            </a:xfrm>
+            <a:prstGeom prst="bentConnector3">
+              <a:avLst>
+                <a:gd name="adj1" fmla="val 58021"/>
+              </a:avLst>
+            </a:prstGeom>
+            <a:ln w="28575">
+              <a:solidFill>
+                <a:srgbClr val="FF0000"/>
+              </a:solidFill>
+            </a:ln>
+          </p:spPr>
+          <p:style>
+            <a:lnRef idx="1">
+              <a:schemeClr val="accent1"/>
+            </a:lnRef>
+            <a:fillRef idx="0">
+              <a:schemeClr val="accent1"/>
+            </a:fillRef>
+            <a:effectRef idx="0">
+              <a:schemeClr val="accent1"/>
+            </a:effectRef>
+            <a:fontRef idx="minor">
+              <a:schemeClr val="tx1"/>
+            </a:fontRef>
+          </p:style>
+        </p:cxnSp>
+        <p:cxnSp>
+          <p:nvCxnSpPr>
+            <p:cNvPr id="19" name="肘形接點 18"/>
+            <p:cNvCxnSpPr/>
+            <p:nvPr/>
+          </p:nvCxnSpPr>
+          <p:spPr>
+            <a:xfrm rot="10800000" flipV="1">
+              <a:off x="4958788" y="4002316"/>
+              <a:ext cx="1404000" cy="1440000"/>
+            </a:xfrm>
+            <a:prstGeom prst="bentConnector3">
+              <a:avLst>
+                <a:gd name="adj1" fmla="val 41119"/>
+              </a:avLst>
+            </a:prstGeom>
+            <a:ln w="28575">
+              <a:solidFill>
+                <a:schemeClr val="tx1"/>
+              </a:solidFill>
+            </a:ln>
+          </p:spPr>
+          <p:style>
+            <a:lnRef idx="1">
+              <a:schemeClr val="accent1"/>
+            </a:lnRef>
+            <a:fillRef idx="0">
+              <a:schemeClr val="accent1"/>
+            </a:fillRef>
+            <a:effectRef idx="0">
+              <a:schemeClr val="accent1"/>
+            </a:effectRef>
+            <a:fontRef idx="minor">
+              <a:schemeClr val="tx1"/>
+            </a:fontRef>
+          </p:style>
+        </p:cxnSp>
+      </p:grpSp>
+    </p:spTree>
+    <p:extLst>
+      <p:ext uri="{BB962C8B-B14F-4D97-AF65-F5344CB8AC3E}">
+        <p14:creationId xmlns:p14="http://schemas.microsoft.com/office/powerpoint/2010/main" val="642644643"/>
+      </p:ext>
+    </p:extLst>
+  </p:cSld>
+  <p:clrMapOvr>
+    <a:masterClrMapping/>
+  </p:clrMapOvr>
+</p:sld>
+</file>
+
 <file path=ppt/theme/theme1.xml><?xml version="1.0" encoding="utf-8"?>
 <a:theme xmlns:a="http://schemas.openxmlformats.org/drawingml/2006/main" name="Office 佈景主題">
   <a:themeElements>

</xml_diff>